<commit_message>
October Crime Reports - Corrected
</commit_message>
<xml_diff>
--- a/src/notebooks/wumc-template.pptx
+++ b/src/notebooks/wumc-template.pptx
@@ -5,12 +5,13 @@
     <p:sldMasterId id="2147483648" r:id="rId1"/>
   </p:sldMasterIdLst>
   <p:notesMasterIdLst>
-    <p:notesMasterId r:id="rId5"/>
+    <p:notesMasterId r:id="rId6"/>
   </p:notesMasterIdLst>
   <p:sldIdLst>
     <p:sldId id="328" r:id="rId2"/>
-    <p:sldId id="428" r:id="rId3"/>
-    <p:sldId id="429" r:id="rId4"/>
+    <p:sldId id="429" r:id="rId3"/>
+    <p:sldId id="428" r:id="rId4"/>
+    <p:sldId id="430" r:id="rId5"/>
   </p:sldIdLst>
   <p:sldSz cx="9144000" cy="6858000" type="screen4x3"/>
   <p:notesSz cx="7315200" cy="9601200"/>
@@ -341,35 +342,35 @@
           <a:p>
             <a:pPr lvl="0"/>
             <a:r>
-              <a:rPr lang="en-US" noProof="0" smtClean="0"/>
+              <a:rPr lang="en-US" noProof="0"/>
               <a:t>Click to edit Master text styles</a:t>
             </a:r>
           </a:p>
           <a:p>
             <a:pPr lvl="1"/>
             <a:r>
-              <a:rPr lang="en-US" noProof="0" smtClean="0"/>
+              <a:rPr lang="en-US" noProof="0"/>
               <a:t>Second level</a:t>
             </a:r>
           </a:p>
           <a:p>
             <a:pPr lvl="2"/>
             <a:r>
-              <a:rPr lang="en-US" noProof="0" smtClean="0"/>
+              <a:rPr lang="en-US" noProof="0"/>
               <a:t>Third level</a:t>
             </a:r>
           </a:p>
           <a:p>
             <a:pPr lvl="3"/>
             <a:r>
-              <a:rPr lang="en-US" noProof="0" smtClean="0"/>
+              <a:rPr lang="en-US" noProof="0"/>
               <a:t>Fourth level</a:t>
             </a:r>
           </a:p>
           <a:p>
             <a:pPr lvl="4"/>
             <a:r>
-              <a:rPr lang="en-US" noProof="0" smtClean="0"/>
+              <a:rPr lang="en-US" noProof="0"/>
               <a:t>Fifth level</a:t>
             </a:r>
           </a:p>
@@ -647,7 +648,7 @@
               <a:pPr defTabSz="913793"/>
               <a:t>1</a:t>
             </a:fld>
-            <a:endParaRPr lang="en-US" dirty="0" smtClean="0"/>
+            <a:endParaRPr lang="en-US" dirty="0"/>
           </a:p>
         </p:txBody>
       </p:sp>
@@ -683,11 +684,101 @@
           <a:bodyPr/>
           <a:lstStyle/>
           <a:p>
-            <a:endParaRPr lang="en-US" smtClean="0"/>
+            <a:endParaRPr lang="en-US"/>
           </a:p>
         </p:txBody>
       </p:sp>
     </p:spTree>
+  </p:cSld>
+  <p:clrMapOvr>
+    <a:masterClrMapping/>
+  </p:clrMapOvr>
+</p:notes>
+</file>
+
+<file path=ppt/notesSlides/notesSlide2.xml><?xml version="1.0" encoding="utf-8"?>
+<p:notes xmlns:a="http://schemas.openxmlformats.org/drawingml/2006/main" xmlns:r="http://schemas.openxmlformats.org/officeDocument/2006/relationships" xmlns:p="http://schemas.openxmlformats.org/presentationml/2006/main">
+  <p:cSld>
+    <p:spTree>
+      <p:nvGrpSpPr>
+        <p:cNvPr id="1" name=""/>
+        <p:cNvGrpSpPr/>
+        <p:nvPr/>
+      </p:nvGrpSpPr>
+      <p:grpSpPr>
+        <a:xfrm>
+          <a:off x="0" y="0"/>
+          <a:ext cx="0" cy="0"/>
+          <a:chOff x="0" y="0"/>
+          <a:chExt cx="0" cy="0"/>
+        </a:xfrm>
+      </p:grpSpPr>
+      <p:sp>
+        <p:nvSpPr>
+          <p:cNvPr id="2" name="Slide Image Placeholder 1"/>
+          <p:cNvSpPr>
+            <a:spLocks noGrp="1" noRot="1" noChangeAspect="1"/>
+          </p:cNvSpPr>
+          <p:nvPr>
+            <p:ph type="sldImg"/>
+          </p:nvPr>
+        </p:nvSpPr>
+        <p:spPr/>
+      </p:sp>
+      <p:sp>
+        <p:nvSpPr>
+          <p:cNvPr id="3" name="Notes Placeholder 2"/>
+          <p:cNvSpPr>
+            <a:spLocks noGrp="1"/>
+          </p:cNvSpPr>
+          <p:nvPr>
+            <p:ph type="body" idx="1"/>
+          </p:nvPr>
+        </p:nvSpPr>
+        <p:spPr/>
+        <p:txBody>
+          <a:bodyPr/>
+          <a:lstStyle/>
+          <a:p>
+            <a:endParaRPr lang="en-US"/>
+          </a:p>
+        </p:txBody>
+      </p:sp>
+      <p:sp>
+        <p:nvSpPr>
+          <p:cNvPr id="4" name="Slide Number Placeholder 3"/>
+          <p:cNvSpPr>
+            <a:spLocks noGrp="1"/>
+          </p:cNvSpPr>
+          <p:nvPr>
+            <p:ph type="sldNum" sz="quarter" idx="5"/>
+          </p:nvPr>
+        </p:nvSpPr>
+        <p:spPr/>
+        <p:txBody>
+          <a:bodyPr/>
+          <a:lstStyle/>
+          <a:p>
+            <a:pPr>
+              <a:defRPr/>
+            </a:pPr>
+            <a:fld id="{523C5FD7-151E-4780-9C2D-3A76560A02D1}" type="slidenum">
+              <a:rPr lang="en-US" smtClean="0"/>
+              <a:pPr>
+                <a:defRPr/>
+              </a:pPr>
+              <a:t>4</a:t>
+            </a:fld>
+            <a:endParaRPr lang="en-US"/>
+          </a:p>
+        </p:txBody>
+      </p:sp>
+    </p:spTree>
+    <p:extLst>
+      <p:ext uri="{BB962C8B-B14F-4D97-AF65-F5344CB8AC3E}">
+        <p14:creationId xmlns:p14="http://schemas.microsoft.com/office/powerpoint/2010/main" val="846421918"/>
+      </p:ext>
+    </p:extLst>
   </p:cSld>
   <p:clrMapOvr>
     <a:masterClrMapping/>
@@ -733,10 +824,9 @@
           <a:lstStyle/>
           <a:p>
             <a:r>
-              <a:rPr lang="en-US" smtClean="0"/>
+              <a:rPr lang="en-US"/>
               <a:t>Click to edit Master title style</a:t>
             </a:r>
-            <a:endParaRPr lang="en-US"/>
           </a:p>
         </p:txBody>
       </p:sp>
@@ -798,10 +888,9 @@
           </a:lstStyle>
           <a:p>
             <a:r>
-              <a:rPr lang="en-US" smtClean="0"/>
+              <a:rPr lang="en-US"/>
               <a:t>Click to edit Master subtitle style</a:t>
             </a:r>
-            <a:endParaRPr lang="en-US"/>
           </a:p>
         </p:txBody>
       </p:sp>
@@ -828,10 +917,9 @@
               <a:defRPr/>
             </a:pPr>
             <a:r>
-              <a:rPr lang="en-US" smtClean="0"/>
+              <a:rPr lang="en-US"/>
               <a:t>6-24-2014</a:t>
             </a:r>
-            <a:endParaRPr lang="en-US"/>
           </a:p>
         </p:txBody>
       </p:sp>
@@ -947,10 +1035,9 @@
           <a:lstStyle/>
           <a:p>
             <a:r>
-              <a:rPr lang="en-US" smtClean="0"/>
+              <a:rPr lang="en-US"/>
               <a:t>Click to edit Master title style</a:t>
             </a:r>
-            <a:endParaRPr lang="en-US"/>
           </a:p>
         </p:txBody>
       </p:sp>
@@ -971,38 +1058,37 @@
           <a:p>
             <a:pPr lvl="0"/>
             <a:r>
-              <a:rPr lang="en-US" smtClean="0"/>
+              <a:rPr lang="en-US"/>
               <a:t>Click to edit Master text styles</a:t>
             </a:r>
           </a:p>
           <a:p>
             <a:pPr lvl="1"/>
             <a:r>
-              <a:rPr lang="en-US" smtClean="0"/>
+              <a:rPr lang="en-US"/>
               <a:t>Second level</a:t>
             </a:r>
           </a:p>
           <a:p>
             <a:pPr lvl="2"/>
             <a:r>
-              <a:rPr lang="en-US" smtClean="0"/>
+              <a:rPr lang="en-US"/>
               <a:t>Third level</a:t>
             </a:r>
           </a:p>
           <a:p>
             <a:pPr lvl="3"/>
             <a:r>
-              <a:rPr lang="en-US" smtClean="0"/>
+              <a:rPr lang="en-US"/>
               <a:t>Fourth level</a:t>
             </a:r>
           </a:p>
           <a:p>
             <a:pPr lvl="4"/>
             <a:r>
-              <a:rPr lang="en-US" smtClean="0"/>
+              <a:rPr lang="en-US"/>
               <a:t>Fifth level</a:t>
             </a:r>
-            <a:endParaRPr lang="en-US"/>
           </a:p>
         </p:txBody>
       </p:sp>
@@ -1029,10 +1115,9 @@
               <a:defRPr/>
             </a:pPr>
             <a:r>
-              <a:rPr lang="en-US" smtClean="0"/>
+              <a:rPr lang="en-US"/>
               <a:t>6-24-2014</a:t>
             </a:r>
-            <a:endParaRPr lang="en-US"/>
           </a:p>
         </p:txBody>
       </p:sp>
@@ -1100,10 +1185,9 @@
               <a:t> </a:t>
             </a:r>
             <a:r>
-              <a:rPr lang="en-US" sz="1400" smtClean="0"/>
+              <a:rPr lang="en-US" sz="1400"/>
               <a:t>  </a:t>
             </a:r>
-            <a:endParaRPr lang="en-US" sz="1400"/>
           </a:p>
         </p:txBody>
       </p:sp>
@@ -1154,10 +1238,9 @@
           <a:lstStyle/>
           <a:p>
             <a:r>
-              <a:rPr lang="en-US" smtClean="0"/>
+              <a:rPr lang="en-US"/>
               <a:t>Click to edit Master title style</a:t>
             </a:r>
-            <a:endParaRPr lang="en-US"/>
           </a:p>
         </p:txBody>
       </p:sp>
@@ -1183,38 +1266,37 @@
           <a:p>
             <a:pPr lvl="0"/>
             <a:r>
-              <a:rPr lang="en-US" smtClean="0"/>
+              <a:rPr lang="en-US"/>
               <a:t>Click to edit Master text styles</a:t>
             </a:r>
           </a:p>
           <a:p>
             <a:pPr lvl="1"/>
             <a:r>
-              <a:rPr lang="en-US" smtClean="0"/>
+              <a:rPr lang="en-US"/>
               <a:t>Second level</a:t>
             </a:r>
           </a:p>
           <a:p>
             <a:pPr lvl="2"/>
             <a:r>
-              <a:rPr lang="en-US" smtClean="0"/>
+              <a:rPr lang="en-US"/>
               <a:t>Third level</a:t>
             </a:r>
           </a:p>
           <a:p>
             <a:pPr lvl="3"/>
             <a:r>
-              <a:rPr lang="en-US" smtClean="0"/>
+              <a:rPr lang="en-US"/>
               <a:t>Fourth level</a:t>
             </a:r>
           </a:p>
           <a:p>
             <a:pPr lvl="4"/>
             <a:r>
-              <a:rPr lang="en-US" smtClean="0"/>
+              <a:rPr lang="en-US"/>
               <a:t>Fifth level</a:t>
             </a:r>
-            <a:endParaRPr lang="en-US"/>
           </a:p>
         </p:txBody>
       </p:sp>
@@ -1241,10 +1323,9 @@
               <a:defRPr/>
             </a:pPr>
             <a:r>
-              <a:rPr lang="en-US" smtClean="0"/>
+              <a:rPr lang="en-US"/>
               <a:t>6-24-2014</a:t>
             </a:r>
-            <a:endParaRPr lang="en-US"/>
           </a:p>
         </p:txBody>
       </p:sp>
@@ -1312,10 +1393,9 @@
               <a:t> </a:t>
             </a:r>
             <a:r>
-              <a:rPr lang="en-US" sz="1400" smtClean="0"/>
+              <a:rPr lang="en-US" sz="1400"/>
               <a:t>  </a:t>
             </a:r>
-            <a:endParaRPr lang="en-US" sz="1400"/>
           </a:p>
         </p:txBody>
       </p:sp>
@@ -1366,10 +1446,9 @@
           <a:lstStyle/>
           <a:p>
             <a:r>
-              <a:rPr lang="en-US" smtClean="0"/>
+              <a:rPr lang="en-US"/>
               <a:t>Click to edit Master title style</a:t>
             </a:r>
-            <a:endParaRPr lang="en-US"/>
           </a:p>
         </p:txBody>
       </p:sp>
@@ -1395,38 +1474,37 @@
           <a:p>
             <a:pPr lvl="0"/>
             <a:r>
-              <a:rPr lang="en-US" smtClean="0"/>
+              <a:rPr lang="en-US"/>
               <a:t>Click to edit Master text styles</a:t>
             </a:r>
           </a:p>
           <a:p>
             <a:pPr lvl="1"/>
             <a:r>
-              <a:rPr lang="en-US" smtClean="0"/>
+              <a:rPr lang="en-US"/>
               <a:t>Second level</a:t>
             </a:r>
           </a:p>
           <a:p>
             <a:pPr lvl="2"/>
             <a:r>
-              <a:rPr lang="en-US" smtClean="0"/>
+              <a:rPr lang="en-US"/>
               <a:t>Third level</a:t>
             </a:r>
           </a:p>
           <a:p>
             <a:pPr lvl="3"/>
             <a:r>
-              <a:rPr lang="en-US" smtClean="0"/>
+              <a:rPr lang="en-US"/>
               <a:t>Fourth level</a:t>
             </a:r>
           </a:p>
           <a:p>
             <a:pPr lvl="4"/>
             <a:r>
-              <a:rPr lang="en-US" smtClean="0"/>
+              <a:rPr lang="en-US"/>
               <a:t>Fifth level</a:t>
             </a:r>
-            <a:endParaRPr lang="en-US"/>
           </a:p>
         </p:txBody>
       </p:sp>
@@ -1452,38 +1530,37 @@
           <a:p>
             <a:pPr lvl="0"/>
             <a:r>
-              <a:rPr lang="en-US" smtClean="0"/>
+              <a:rPr lang="en-US"/>
               <a:t>Click to edit Master text styles</a:t>
             </a:r>
           </a:p>
           <a:p>
             <a:pPr lvl="1"/>
             <a:r>
-              <a:rPr lang="en-US" smtClean="0"/>
+              <a:rPr lang="en-US"/>
               <a:t>Second level</a:t>
             </a:r>
           </a:p>
           <a:p>
             <a:pPr lvl="2"/>
             <a:r>
-              <a:rPr lang="en-US" smtClean="0"/>
+              <a:rPr lang="en-US"/>
               <a:t>Third level</a:t>
             </a:r>
           </a:p>
           <a:p>
             <a:pPr lvl="3"/>
             <a:r>
-              <a:rPr lang="en-US" smtClean="0"/>
+              <a:rPr lang="en-US"/>
               <a:t>Fourth level</a:t>
             </a:r>
           </a:p>
           <a:p>
             <a:pPr lvl="4"/>
             <a:r>
-              <a:rPr lang="en-US" smtClean="0"/>
+              <a:rPr lang="en-US"/>
               <a:t>Fifth level</a:t>
             </a:r>
-            <a:endParaRPr lang="en-US"/>
           </a:p>
         </p:txBody>
       </p:sp>
@@ -1510,10 +1587,9 @@
               <a:defRPr/>
             </a:pPr>
             <a:r>
-              <a:rPr lang="en-US" smtClean="0"/>
+              <a:rPr lang="en-US"/>
               <a:t>6-24-2014</a:t>
             </a:r>
-            <a:endParaRPr lang="en-US"/>
           </a:p>
         </p:txBody>
       </p:sp>
@@ -1581,10 +1657,9 @@
               <a:t> </a:t>
             </a:r>
             <a:r>
-              <a:rPr lang="en-US" sz="1400" smtClean="0"/>
+              <a:rPr lang="en-US" sz="1400"/>
               <a:t>  </a:t>
             </a:r>
-            <a:endParaRPr lang="en-US" sz="1400"/>
           </a:p>
         </p:txBody>
       </p:sp>
@@ -1635,10 +1710,9 @@
           <a:lstStyle/>
           <a:p>
             <a:r>
-              <a:rPr lang="en-US" smtClean="0"/>
+              <a:rPr lang="en-US"/>
               <a:t>Click to edit Master title style</a:t>
             </a:r>
-            <a:endParaRPr lang="en-US"/>
           </a:p>
         </p:txBody>
       </p:sp>
@@ -1663,7 +1737,7 @@
           <a:lstStyle/>
           <a:p>
             <a:pPr lvl="0"/>
-            <a:endParaRPr lang="en-US" noProof="0" smtClean="0"/>
+            <a:endParaRPr lang="en-US" noProof="0"/>
           </a:p>
         </p:txBody>
       </p:sp>
@@ -1690,10 +1764,9 @@
               <a:defRPr/>
             </a:pPr>
             <a:r>
-              <a:rPr lang="en-US" smtClean="0"/>
+              <a:rPr lang="en-US"/>
               <a:t>6-24-2014</a:t>
             </a:r>
-            <a:endParaRPr lang="en-US"/>
           </a:p>
         </p:txBody>
       </p:sp>
@@ -1814,10 +1887,9 @@
           <a:lstStyle/>
           <a:p>
             <a:r>
-              <a:rPr lang="en-US" smtClean="0"/>
+              <a:rPr lang="en-US"/>
               <a:t>Click to edit Master title style</a:t>
             </a:r>
-            <a:endParaRPr lang="en-US"/>
           </a:p>
         </p:txBody>
       </p:sp>
@@ -1843,38 +1915,37 @@
           <a:p>
             <a:pPr lvl="0"/>
             <a:r>
-              <a:rPr lang="en-US" smtClean="0"/>
+              <a:rPr lang="en-US"/>
               <a:t>Click to edit Master text styles</a:t>
             </a:r>
           </a:p>
           <a:p>
             <a:pPr lvl="1"/>
             <a:r>
-              <a:rPr lang="en-US" smtClean="0"/>
+              <a:rPr lang="en-US"/>
               <a:t>Second level</a:t>
             </a:r>
           </a:p>
           <a:p>
             <a:pPr lvl="2"/>
             <a:r>
-              <a:rPr lang="en-US" smtClean="0"/>
+              <a:rPr lang="en-US"/>
               <a:t>Third level</a:t>
             </a:r>
           </a:p>
           <a:p>
             <a:pPr lvl="3"/>
             <a:r>
-              <a:rPr lang="en-US" smtClean="0"/>
+              <a:rPr lang="en-US"/>
               <a:t>Fourth level</a:t>
             </a:r>
           </a:p>
           <a:p>
             <a:pPr lvl="4"/>
             <a:r>
-              <a:rPr lang="en-US" smtClean="0"/>
+              <a:rPr lang="en-US"/>
               <a:t>Fifth level</a:t>
             </a:r>
-            <a:endParaRPr lang="en-US"/>
           </a:p>
         </p:txBody>
       </p:sp>
@@ -1900,38 +1971,37 @@
           <a:p>
             <a:pPr lvl="0"/>
             <a:r>
-              <a:rPr lang="en-US" smtClean="0"/>
+              <a:rPr lang="en-US"/>
               <a:t>Click to edit Master text styles</a:t>
             </a:r>
           </a:p>
           <a:p>
             <a:pPr lvl="1"/>
             <a:r>
-              <a:rPr lang="en-US" smtClean="0"/>
+              <a:rPr lang="en-US"/>
               <a:t>Second level</a:t>
             </a:r>
           </a:p>
           <a:p>
             <a:pPr lvl="2"/>
             <a:r>
-              <a:rPr lang="en-US" smtClean="0"/>
+              <a:rPr lang="en-US"/>
               <a:t>Third level</a:t>
             </a:r>
           </a:p>
           <a:p>
             <a:pPr lvl="3"/>
             <a:r>
-              <a:rPr lang="en-US" smtClean="0"/>
+              <a:rPr lang="en-US"/>
               <a:t>Fourth level</a:t>
             </a:r>
           </a:p>
           <a:p>
             <a:pPr lvl="4"/>
             <a:r>
-              <a:rPr lang="en-US" smtClean="0"/>
+              <a:rPr lang="en-US"/>
               <a:t>Fifth level</a:t>
             </a:r>
-            <a:endParaRPr lang="en-US"/>
           </a:p>
         </p:txBody>
       </p:sp>
@@ -1957,38 +2027,37 @@
           <a:p>
             <a:pPr lvl="0"/>
             <a:r>
-              <a:rPr lang="en-US" smtClean="0"/>
+              <a:rPr lang="en-US"/>
               <a:t>Click to edit Master text styles</a:t>
             </a:r>
           </a:p>
           <a:p>
             <a:pPr lvl="1"/>
             <a:r>
-              <a:rPr lang="en-US" smtClean="0"/>
+              <a:rPr lang="en-US"/>
               <a:t>Second level</a:t>
             </a:r>
           </a:p>
           <a:p>
             <a:pPr lvl="2"/>
             <a:r>
-              <a:rPr lang="en-US" smtClean="0"/>
+              <a:rPr lang="en-US"/>
               <a:t>Third level</a:t>
             </a:r>
           </a:p>
           <a:p>
             <a:pPr lvl="3"/>
             <a:r>
-              <a:rPr lang="en-US" smtClean="0"/>
+              <a:rPr lang="en-US"/>
               <a:t>Fourth level</a:t>
             </a:r>
           </a:p>
           <a:p>
             <a:pPr lvl="4"/>
             <a:r>
-              <a:rPr lang="en-US" smtClean="0"/>
+              <a:rPr lang="en-US"/>
               <a:t>Fifth level</a:t>
             </a:r>
-            <a:endParaRPr lang="en-US"/>
           </a:p>
         </p:txBody>
       </p:sp>
@@ -2074,10 +2143,9 @@
               <a:defRPr/>
             </a:pPr>
             <a:r>
-              <a:rPr lang="en-US" smtClean="0"/>
+              <a:rPr lang="en-US"/>
               <a:t>6-24-2014</a:t>
             </a:r>
-            <a:endParaRPr lang="en-US"/>
           </a:p>
         </p:txBody>
       </p:sp>
@@ -2122,10 +2190,9 @@
           <a:lstStyle/>
           <a:p>
             <a:r>
-              <a:rPr lang="en-US" smtClean="0"/>
+              <a:rPr lang="en-US"/>
               <a:t>Click to edit Master title style</a:t>
             </a:r>
-            <a:endParaRPr lang="en-US"/>
           </a:p>
         </p:txBody>
       </p:sp>
@@ -2146,38 +2213,37 @@
           <a:p>
             <a:pPr lvl="0"/>
             <a:r>
-              <a:rPr lang="en-US" dirty="0" smtClean="0"/>
+              <a:rPr lang="en-US" dirty="0"/>
               <a:t>Click to edit Master text styles</a:t>
             </a:r>
           </a:p>
           <a:p>
             <a:pPr lvl="1"/>
             <a:r>
-              <a:rPr lang="en-US" dirty="0" smtClean="0"/>
+              <a:rPr lang="en-US" dirty="0"/>
               <a:t>Second level</a:t>
             </a:r>
           </a:p>
           <a:p>
             <a:pPr lvl="2"/>
             <a:r>
-              <a:rPr lang="en-US" dirty="0" smtClean="0"/>
+              <a:rPr lang="en-US" dirty="0"/>
               <a:t>Third level</a:t>
             </a:r>
           </a:p>
           <a:p>
             <a:pPr lvl="3"/>
             <a:r>
-              <a:rPr lang="en-US" dirty="0" smtClean="0"/>
+              <a:rPr lang="en-US" dirty="0"/>
               <a:t>Fourth level</a:t>
             </a:r>
           </a:p>
           <a:p>
             <a:pPr lvl="4"/>
             <a:r>
-              <a:rPr lang="en-US" dirty="0" smtClean="0"/>
+              <a:rPr lang="en-US" dirty="0"/>
               <a:t>Fifth level</a:t>
             </a:r>
-            <a:endParaRPr lang="en-US" dirty="0"/>
           </a:p>
         </p:txBody>
       </p:sp>
@@ -2289,10 +2355,9 @@
           </a:lstStyle>
           <a:p>
             <a:r>
-              <a:rPr lang="en-US" smtClean="0"/>
+              <a:rPr lang="en-US"/>
               <a:t>Click to edit Master title style</a:t>
             </a:r>
-            <a:endParaRPr lang="en-US"/>
           </a:p>
         </p:txBody>
       </p:sp>
@@ -2355,7 +2420,7 @@
           <a:p>
             <a:pPr lvl="0"/>
             <a:r>
-              <a:rPr lang="en-US" smtClean="0"/>
+              <a:rPr lang="en-US"/>
               <a:t>Click to edit Master text styles</a:t>
             </a:r>
           </a:p>
@@ -2384,10 +2449,9 @@
               <a:defRPr/>
             </a:pPr>
             <a:r>
-              <a:rPr lang="en-US" smtClean="0"/>
+              <a:rPr lang="en-US"/>
               <a:t>6-24-2014</a:t>
             </a:r>
-            <a:endParaRPr lang="en-US"/>
           </a:p>
         </p:txBody>
       </p:sp>
@@ -2455,10 +2519,9 @@
               <a:t> </a:t>
             </a:r>
             <a:r>
-              <a:rPr lang="en-US" sz="1400" smtClean="0"/>
+              <a:rPr lang="en-US" sz="1400"/>
               <a:t>  </a:t>
             </a:r>
-            <a:endParaRPr lang="en-US" sz="1400"/>
           </a:p>
         </p:txBody>
       </p:sp>
@@ -2504,10 +2567,9 @@
           <a:lstStyle/>
           <a:p>
             <a:r>
-              <a:rPr lang="en-US" smtClean="0"/>
+              <a:rPr lang="en-US"/>
               <a:t>Click to edit Master title style</a:t>
             </a:r>
-            <a:endParaRPr lang="en-US"/>
           </a:p>
         </p:txBody>
       </p:sp>
@@ -2561,38 +2623,37 @@
           <a:p>
             <a:pPr lvl="0"/>
             <a:r>
-              <a:rPr lang="en-US" smtClean="0"/>
+              <a:rPr lang="en-US"/>
               <a:t>Click to edit Master text styles</a:t>
             </a:r>
           </a:p>
           <a:p>
             <a:pPr lvl="1"/>
             <a:r>
-              <a:rPr lang="en-US" smtClean="0"/>
+              <a:rPr lang="en-US"/>
               <a:t>Second level</a:t>
             </a:r>
           </a:p>
           <a:p>
             <a:pPr lvl="2"/>
             <a:r>
-              <a:rPr lang="en-US" smtClean="0"/>
+              <a:rPr lang="en-US"/>
               <a:t>Third level</a:t>
             </a:r>
           </a:p>
           <a:p>
             <a:pPr lvl="3"/>
             <a:r>
-              <a:rPr lang="en-US" smtClean="0"/>
+              <a:rPr lang="en-US"/>
               <a:t>Fourth level</a:t>
             </a:r>
           </a:p>
           <a:p>
             <a:pPr lvl="4"/>
             <a:r>
-              <a:rPr lang="en-US" smtClean="0"/>
+              <a:rPr lang="en-US"/>
               <a:t>Fifth level</a:t>
             </a:r>
-            <a:endParaRPr lang="en-US"/>
           </a:p>
         </p:txBody>
       </p:sp>
@@ -2646,38 +2707,37 @@
           <a:p>
             <a:pPr lvl="0"/>
             <a:r>
-              <a:rPr lang="en-US" smtClean="0"/>
+              <a:rPr lang="en-US"/>
               <a:t>Click to edit Master text styles</a:t>
             </a:r>
           </a:p>
           <a:p>
             <a:pPr lvl="1"/>
             <a:r>
-              <a:rPr lang="en-US" smtClean="0"/>
+              <a:rPr lang="en-US"/>
               <a:t>Second level</a:t>
             </a:r>
           </a:p>
           <a:p>
             <a:pPr lvl="2"/>
             <a:r>
-              <a:rPr lang="en-US" smtClean="0"/>
+              <a:rPr lang="en-US"/>
               <a:t>Third level</a:t>
             </a:r>
           </a:p>
           <a:p>
             <a:pPr lvl="3"/>
             <a:r>
-              <a:rPr lang="en-US" smtClean="0"/>
+              <a:rPr lang="en-US"/>
               <a:t>Fourth level</a:t>
             </a:r>
           </a:p>
           <a:p>
             <a:pPr lvl="4"/>
             <a:r>
-              <a:rPr lang="en-US" smtClean="0"/>
+              <a:rPr lang="en-US"/>
               <a:t>Fifth level</a:t>
             </a:r>
-            <a:endParaRPr lang="en-US"/>
           </a:p>
         </p:txBody>
       </p:sp>
@@ -2709,10 +2769,9 @@
               <a:defRPr/>
             </a:pPr>
             <a:r>
-              <a:rPr lang="en-US" smtClean="0"/>
+              <a:rPr lang="en-US"/>
               <a:t>6-24-2014</a:t>
             </a:r>
-            <a:endParaRPr lang="en-US"/>
           </a:p>
         </p:txBody>
       </p:sp>
@@ -2790,10 +2849,9 @@
               <a:t> </a:t>
             </a:r>
             <a:r>
-              <a:rPr lang="en-US" sz="1400" smtClean="0"/>
+              <a:rPr lang="en-US" sz="1400"/>
               <a:t>  </a:t>
             </a:r>
-            <a:endParaRPr lang="en-US" sz="1400"/>
           </a:p>
         </p:txBody>
       </p:sp>
@@ -2848,10 +2906,9 @@
           </a:lstStyle>
           <a:p>
             <a:r>
-              <a:rPr lang="en-US" smtClean="0"/>
+              <a:rPr lang="en-US"/>
               <a:t>Click to edit Master title style</a:t>
             </a:r>
-            <a:endParaRPr lang="en-US"/>
           </a:p>
         </p:txBody>
       </p:sp>
@@ -2914,7 +2971,7 @@
           <a:p>
             <a:pPr lvl="0"/>
             <a:r>
-              <a:rPr lang="en-US" smtClean="0"/>
+              <a:rPr lang="en-US"/>
               <a:t>Click to edit Master text styles</a:t>
             </a:r>
           </a:p>
@@ -2970,38 +3027,37 @@
           <a:p>
             <a:pPr lvl="0"/>
             <a:r>
-              <a:rPr lang="en-US" smtClean="0"/>
+              <a:rPr lang="en-US"/>
               <a:t>Click to edit Master text styles</a:t>
             </a:r>
           </a:p>
           <a:p>
             <a:pPr lvl="1"/>
             <a:r>
-              <a:rPr lang="en-US" smtClean="0"/>
+              <a:rPr lang="en-US"/>
               <a:t>Second level</a:t>
             </a:r>
           </a:p>
           <a:p>
             <a:pPr lvl="2"/>
             <a:r>
-              <a:rPr lang="en-US" smtClean="0"/>
+              <a:rPr lang="en-US"/>
               <a:t>Third level</a:t>
             </a:r>
           </a:p>
           <a:p>
             <a:pPr lvl="3"/>
             <a:r>
-              <a:rPr lang="en-US" smtClean="0"/>
+              <a:rPr lang="en-US"/>
               <a:t>Fourth level</a:t>
             </a:r>
           </a:p>
           <a:p>
             <a:pPr lvl="4"/>
             <a:r>
-              <a:rPr lang="en-US" smtClean="0"/>
+              <a:rPr lang="en-US"/>
               <a:t>Fifth level</a:t>
             </a:r>
-            <a:endParaRPr lang="en-US"/>
           </a:p>
         </p:txBody>
       </p:sp>
@@ -3064,7 +3120,7 @@
           <a:p>
             <a:pPr lvl="0"/>
             <a:r>
-              <a:rPr lang="en-US" smtClean="0"/>
+              <a:rPr lang="en-US"/>
               <a:t>Click to edit Master text styles</a:t>
             </a:r>
           </a:p>
@@ -3120,38 +3176,37 @@
           <a:p>
             <a:pPr lvl="0"/>
             <a:r>
-              <a:rPr lang="en-US" smtClean="0"/>
+              <a:rPr lang="en-US"/>
               <a:t>Click to edit Master text styles</a:t>
             </a:r>
           </a:p>
           <a:p>
             <a:pPr lvl="1"/>
             <a:r>
-              <a:rPr lang="en-US" smtClean="0"/>
+              <a:rPr lang="en-US"/>
               <a:t>Second level</a:t>
             </a:r>
           </a:p>
           <a:p>
             <a:pPr lvl="2"/>
             <a:r>
-              <a:rPr lang="en-US" smtClean="0"/>
+              <a:rPr lang="en-US"/>
               <a:t>Third level</a:t>
             </a:r>
           </a:p>
           <a:p>
             <a:pPr lvl="3"/>
             <a:r>
-              <a:rPr lang="en-US" smtClean="0"/>
+              <a:rPr lang="en-US"/>
               <a:t>Fourth level</a:t>
             </a:r>
           </a:p>
           <a:p>
             <a:pPr lvl="4"/>
             <a:r>
-              <a:rPr lang="en-US" smtClean="0"/>
+              <a:rPr lang="en-US"/>
               <a:t>Fifth level</a:t>
             </a:r>
-            <a:endParaRPr lang="en-US"/>
           </a:p>
         </p:txBody>
       </p:sp>
@@ -3178,10 +3233,9 @@
               <a:defRPr/>
             </a:pPr>
             <a:r>
-              <a:rPr lang="en-US" smtClean="0"/>
+              <a:rPr lang="en-US"/>
               <a:t>6-24-2014</a:t>
             </a:r>
-            <a:endParaRPr lang="en-US"/>
           </a:p>
         </p:txBody>
       </p:sp>
@@ -3249,10 +3303,9 @@
               <a:t> </a:t>
             </a:r>
             <a:r>
-              <a:rPr lang="en-US" sz="1400" smtClean="0"/>
+              <a:rPr lang="en-US" sz="1400"/>
               <a:t>  </a:t>
             </a:r>
-            <a:endParaRPr lang="en-US" sz="1400"/>
           </a:p>
         </p:txBody>
       </p:sp>
@@ -3298,10 +3351,9 @@
           <a:lstStyle/>
           <a:p>
             <a:r>
-              <a:rPr lang="en-US" smtClean="0"/>
+              <a:rPr lang="en-US"/>
               <a:t>Click to edit Master title style</a:t>
             </a:r>
-            <a:endParaRPr lang="en-US"/>
           </a:p>
         </p:txBody>
       </p:sp>
@@ -3328,10 +3380,9 @@
               <a:defRPr/>
             </a:pPr>
             <a:r>
-              <a:rPr lang="en-US" smtClean="0"/>
+              <a:rPr lang="en-US"/>
               <a:t>6-24-2014</a:t>
             </a:r>
-            <a:endParaRPr lang="en-US"/>
           </a:p>
         </p:txBody>
       </p:sp>
@@ -3399,10 +3450,9 @@
               <a:t> </a:t>
             </a:r>
             <a:r>
-              <a:rPr lang="en-US" sz="1400" smtClean="0"/>
+              <a:rPr lang="en-US" sz="1400"/>
               <a:t>  </a:t>
             </a:r>
-            <a:endParaRPr lang="en-US" sz="1400"/>
           </a:p>
         </p:txBody>
       </p:sp>
@@ -3455,10 +3505,9 @@
               <a:defRPr/>
             </a:pPr>
             <a:r>
-              <a:rPr lang="en-US" smtClean="0"/>
+              <a:rPr lang="en-US"/>
               <a:t>6-24-2014</a:t>
             </a:r>
-            <a:endParaRPr lang="en-US"/>
           </a:p>
         </p:txBody>
       </p:sp>
@@ -3526,10 +3575,9 @@
               <a:t> </a:t>
             </a:r>
             <a:r>
-              <a:rPr lang="en-US" sz="1400" smtClean="0"/>
+              <a:rPr lang="en-US" sz="1400"/>
               <a:t>  </a:t>
             </a:r>
-            <a:endParaRPr lang="en-US" sz="1400"/>
           </a:p>
         </p:txBody>
       </p:sp>
@@ -3584,10 +3632,9 @@
           </a:lstStyle>
           <a:p>
             <a:r>
-              <a:rPr lang="en-US" smtClean="0"/>
+              <a:rPr lang="en-US"/>
               <a:t>Click to edit Master title style</a:t>
             </a:r>
-            <a:endParaRPr lang="en-US"/>
           </a:p>
         </p:txBody>
       </p:sp>
@@ -3641,38 +3688,37 @@
           <a:p>
             <a:pPr lvl="0"/>
             <a:r>
-              <a:rPr lang="en-US" smtClean="0"/>
+              <a:rPr lang="en-US"/>
               <a:t>Click to edit Master text styles</a:t>
             </a:r>
           </a:p>
           <a:p>
             <a:pPr lvl="1"/>
             <a:r>
-              <a:rPr lang="en-US" smtClean="0"/>
+              <a:rPr lang="en-US"/>
               <a:t>Second level</a:t>
             </a:r>
           </a:p>
           <a:p>
             <a:pPr lvl="2"/>
             <a:r>
-              <a:rPr lang="en-US" smtClean="0"/>
+              <a:rPr lang="en-US"/>
               <a:t>Third level</a:t>
             </a:r>
           </a:p>
           <a:p>
             <a:pPr lvl="3"/>
             <a:r>
-              <a:rPr lang="en-US" smtClean="0"/>
+              <a:rPr lang="en-US"/>
               <a:t>Fourth level</a:t>
             </a:r>
           </a:p>
           <a:p>
             <a:pPr lvl="4"/>
             <a:r>
-              <a:rPr lang="en-US" smtClean="0"/>
+              <a:rPr lang="en-US"/>
               <a:t>Fifth level</a:t>
             </a:r>
-            <a:endParaRPr lang="en-US"/>
           </a:p>
         </p:txBody>
       </p:sp>
@@ -3735,7 +3781,7 @@
           <a:p>
             <a:pPr lvl="0"/>
             <a:r>
-              <a:rPr lang="en-US" smtClean="0"/>
+              <a:rPr lang="en-US"/>
               <a:t>Click to edit Master text styles</a:t>
             </a:r>
           </a:p>
@@ -3764,10 +3810,9 @@
               <a:defRPr/>
             </a:pPr>
             <a:r>
-              <a:rPr lang="en-US" smtClean="0"/>
+              <a:rPr lang="en-US"/>
               <a:t>6-24-2014</a:t>
             </a:r>
-            <a:endParaRPr lang="en-US"/>
           </a:p>
         </p:txBody>
       </p:sp>
@@ -3835,10 +3880,9 @@
               <a:t> </a:t>
             </a:r>
             <a:r>
-              <a:rPr lang="en-US" sz="1400" smtClean="0"/>
+              <a:rPr lang="en-US" sz="1400"/>
               <a:t>  </a:t>
             </a:r>
-            <a:endParaRPr lang="en-US" sz="1400"/>
           </a:p>
         </p:txBody>
       </p:sp>
@@ -3893,10 +3937,9 @@
           </a:lstStyle>
           <a:p>
             <a:r>
-              <a:rPr lang="en-US" smtClean="0"/>
+              <a:rPr lang="en-US"/>
               <a:t>Click to edit Master title style</a:t>
             </a:r>
-            <a:endParaRPr lang="en-US"/>
           </a:p>
         </p:txBody>
       </p:sp>
@@ -3958,7 +4001,7 @@
           </a:lstStyle>
           <a:p>
             <a:pPr lvl="0"/>
-            <a:endParaRPr lang="en-US" noProof="0" smtClean="0"/>
+            <a:endParaRPr lang="en-US" noProof="0"/>
           </a:p>
         </p:txBody>
       </p:sp>
@@ -4021,7 +4064,7 @@
           <a:p>
             <a:pPr lvl="0"/>
             <a:r>
-              <a:rPr lang="en-US" smtClean="0"/>
+              <a:rPr lang="en-US"/>
               <a:t>Click to edit Master text styles</a:t>
             </a:r>
           </a:p>
@@ -4050,10 +4093,9 @@
               <a:defRPr/>
             </a:pPr>
             <a:r>
-              <a:rPr lang="en-US" smtClean="0"/>
+              <a:rPr lang="en-US"/>
               <a:t>6-24-2014</a:t>
             </a:r>
-            <a:endParaRPr lang="en-US"/>
           </a:p>
         </p:txBody>
       </p:sp>
@@ -4121,10 +4163,9 @@
               <a:t> </a:t>
             </a:r>
             <a:r>
-              <a:rPr lang="en-US" sz="1400" smtClean="0"/>
+              <a:rPr lang="en-US" sz="1400"/>
               <a:t>  </a:t>
             </a:r>
-            <a:endParaRPr lang="en-US" sz="1400"/>
           </a:p>
         </p:txBody>
       </p:sp>
@@ -4198,7 +4239,7 @@
           <a:p>
             <a:pPr lvl="0"/>
             <a:r>
-              <a:rPr lang="en-US" smtClean="0"/>
+              <a:rPr lang="en-US"/>
               <a:t>Click to edit Master title style</a:t>
             </a:r>
           </a:p>
@@ -4240,35 +4281,35 @@
           <a:p>
             <a:pPr lvl="0"/>
             <a:r>
-              <a:rPr lang="en-US" smtClean="0"/>
+              <a:rPr lang="en-US"/>
               <a:t>Click to edit Master text styles</a:t>
             </a:r>
           </a:p>
           <a:p>
             <a:pPr lvl="1"/>
             <a:r>
-              <a:rPr lang="en-US" smtClean="0"/>
+              <a:rPr lang="en-US"/>
               <a:t>Second level</a:t>
             </a:r>
           </a:p>
           <a:p>
             <a:pPr lvl="2"/>
             <a:r>
-              <a:rPr lang="en-US" smtClean="0"/>
+              <a:rPr lang="en-US"/>
               <a:t>Third level</a:t>
             </a:r>
           </a:p>
           <a:p>
             <a:pPr lvl="3"/>
             <a:r>
-              <a:rPr lang="en-US" smtClean="0"/>
+              <a:rPr lang="en-US"/>
               <a:t>Fourth level</a:t>
             </a:r>
           </a:p>
           <a:p>
             <a:pPr lvl="4"/>
             <a:r>
-              <a:rPr lang="en-US" smtClean="0"/>
+              <a:rPr lang="en-US"/>
               <a:t>Fifth level</a:t>
             </a:r>
           </a:p>
@@ -4317,10 +4358,9 @@
               <a:defRPr/>
             </a:pPr>
             <a:r>
-              <a:rPr lang="en-US" smtClean="0"/>
+              <a:rPr lang="en-US"/>
               <a:t>6-24-2014</a:t>
             </a:r>
-            <a:endParaRPr lang="en-US"/>
           </a:p>
         </p:txBody>
       </p:sp>
@@ -5135,13 +5175,6 @@
     <a:masterClrMapping/>
   </p:clrMapOvr>
   <p:transition spd="slow"/>
-  <p:timing>
-    <p:tnLst>
-      <p:par>
-        <p:cTn id="1" dur="indefinite" restart="never" nodeType="tmRoot"/>
-      </p:par>
-    </p:tnLst>
-  </p:timing>
 </p:sld>
 </file>
 
@@ -5164,7 +5197,13 @@
       </p:grpSpPr>
       <p:sp>
         <p:nvSpPr>
-          <p:cNvPr id="5" name="Title 4"/>
+          <p:cNvPr id="2" name="Title 1">
+            <a:extLst>
+              <a:ext uri="{FF2B5EF4-FFF2-40B4-BE49-F238E27FC236}">
+                <a16:creationId xmlns:a16="http://schemas.microsoft.com/office/drawing/2014/main" id="{EE78DCD1-C270-3D4B-8418-51FCEE42C71B}"/>
+              </a:ext>
+            </a:extLst>
+          </p:cNvPr>
           <p:cNvSpPr>
             <a:spLocks noGrp="1"/>
           </p:cNvSpPr>
@@ -5177,18 +5216,24 @@
           <a:bodyPr/>
           <a:lstStyle/>
           <a:p>
-            <a:endParaRPr lang="en-US" dirty="0"/>
-          </a:p>
-        </p:txBody>
-      </p:sp>
-      <p:sp>
-        <p:nvSpPr>
-          <p:cNvPr id="6" name="Text Placeholder 5"/>
+            <a:endParaRPr lang="en-US"/>
+          </a:p>
+        </p:txBody>
+      </p:sp>
+      <p:sp>
+        <p:nvSpPr>
+          <p:cNvPr id="3" name="Content Placeholder 2">
+            <a:extLst>
+              <a:ext uri="{FF2B5EF4-FFF2-40B4-BE49-F238E27FC236}">
+                <a16:creationId xmlns:a16="http://schemas.microsoft.com/office/drawing/2014/main" id="{4F426197-FC82-D141-AB72-1D6938608313}"/>
+              </a:ext>
+            </a:extLst>
+          </p:cNvPr>
           <p:cNvSpPr>
             <a:spLocks noGrp="1"/>
           </p:cNvSpPr>
           <p:nvPr>
-            <p:ph type="body" idx="1"/>
+            <p:ph idx="1"/>
           </p:nvPr>
         </p:nvSpPr>
         <p:spPr/>
@@ -5196,54 +5241,6 @@
           <a:bodyPr/>
           <a:lstStyle/>
           <a:p>
-            <a:endParaRPr lang="en-US" dirty="0"/>
-          </a:p>
-        </p:txBody>
-      </p:sp>
-      <p:sp>
-        <p:nvSpPr>
-          <p:cNvPr id="4" name="Slide Number Placeholder 3"/>
-          <p:cNvSpPr>
-            <a:spLocks noGrp="1"/>
-          </p:cNvSpPr>
-          <p:nvPr>
-            <p:ph type="sldNum" sz="quarter" idx="12"/>
-          </p:nvPr>
-        </p:nvSpPr>
-        <p:spPr/>
-        <p:txBody>
-          <a:bodyPr/>
-          <a:lstStyle/>
-          <a:p>
-            <a:pPr>
-              <a:defRPr/>
-            </a:pPr>
-            <a:endParaRPr lang="en-US" sz="1400" dirty="0"/>
-          </a:p>
-        </p:txBody>
-      </p:sp>
-      <p:sp>
-        <p:nvSpPr>
-          <p:cNvPr id="2" name="Date Placeholder 1"/>
-          <p:cNvSpPr>
-            <a:spLocks noGrp="1"/>
-          </p:cNvSpPr>
-          <p:nvPr>
-            <p:ph type="dt" sz="half" idx="10"/>
-          </p:nvPr>
-        </p:nvSpPr>
-        <p:spPr/>
-        <p:txBody>
-          <a:bodyPr/>
-          <a:lstStyle/>
-          <a:p>
-            <a:pPr>
-              <a:defRPr/>
-            </a:pPr>
-            <a:r>
-              <a:rPr lang="en-US" smtClean="0"/>
-              <a:t>6-24-2014</a:t>
-            </a:r>
             <a:endParaRPr lang="en-US"/>
           </a:p>
         </p:txBody>
@@ -5251,7 +5248,7 @@
     </p:spTree>
     <p:extLst>
       <p:ext uri="{BB962C8B-B14F-4D97-AF65-F5344CB8AC3E}">
-        <p14:creationId xmlns:p14="http://schemas.microsoft.com/office/powerpoint/2010/main" val="3869798691"/>
+        <p14:creationId xmlns:p14="http://schemas.microsoft.com/office/powerpoint/2010/main" val="3911955359"/>
       </p:ext>
     </p:extLst>
   </p:cSld>
@@ -5281,7 +5278,7 @@
       </p:grpSpPr>
       <p:sp>
         <p:nvSpPr>
-          <p:cNvPr id="2" name="Title 1"/>
+          <p:cNvPr id="5" name="Title 4"/>
           <p:cNvSpPr>
             <a:spLocks noGrp="1"/>
           </p:cNvSpPr>
@@ -5294,18 +5291,18 @@
           <a:bodyPr/>
           <a:lstStyle/>
           <a:p>
-            <a:endParaRPr lang="en-US"/>
-          </a:p>
-        </p:txBody>
-      </p:sp>
-      <p:sp>
-        <p:nvSpPr>
-          <p:cNvPr id="3" name="Content Placeholder 2"/>
+            <a:endParaRPr lang="en-US" dirty="0"/>
+          </a:p>
+        </p:txBody>
+      </p:sp>
+      <p:sp>
+        <p:nvSpPr>
+          <p:cNvPr id="6" name="Text Placeholder 5"/>
           <p:cNvSpPr>
             <a:spLocks noGrp="1"/>
           </p:cNvSpPr>
           <p:nvPr>
-            <p:ph idx="1"/>
+            <p:ph type="body" idx="1"/>
           </p:nvPr>
         </p:nvSpPr>
         <p:spPr/>
@@ -5313,36 +5310,120 @@
           <a:bodyPr/>
           <a:lstStyle/>
           <a:p>
-            <a:endParaRPr lang="en-US"/>
-          </a:p>
-        </p:txBody>
-      </p:sp>
-      <p:sp>
-        <p:nvSpPr>
-          <p:cNvPr id="4" name="Slide Number Placeholder 3"/>
-          <p:cNvSpPr>
-            <a:spLocks noGrp="1"/>
-          </p:cNvSpPr>
-          <p:nvPr>
-            <p:ph type="sldNum" sz="quarter" idx="12"/>
-          </p:nvPr>
-        </p:nvSpPr>
-        <p:spPr/>
-        <p:txBody>
-          <a:bodyPr/>
-          <a:lstStyle/>
-          <a:p>
-            <a:pPr>
-              <a:defRPr/>
-            </a:pPr>
-            <a:endParaRPr lang="en-US" sz="1400" dirty="0"/>
+            <a:endParaRPr lang="en-US" dirty="0"/>
           </a:p>
         </p:txBody>
       </p:sp>
     </p:spTree>
     <p:extLst>
       <p:ext uri="{BB962C8B-B14F-4D97-AF65-F5344CB8AC3E}">
-        <p14:creationId xmlns:p14="http://schemas.microsoft.com/office/powerpoint/2010/main" val="2555763750"/>
+        <p14:creationId xmlns:p14="http://schemas.microsoft.com/office/powerpoint/2010/main" val="3869798691"/>
+      </p:ext>
+    </p:extLst>
+  </p:cSld>
+  <p:clrMapOvr>
+    <a:masterClrMapping/>
+  </p:clrMapOvr>
+  <p:transition spd="slow"/>
+</p:sld>
+</file>
+
+<file path=ppt/slides/slide4.xml><?xml version="1.0" encoding="utf-8"?>
+<p:sld xmlns:a="http://schemas.openxmlformats.org/drawingml/2006/main" xmlns:r="http://schemas.openxmlformats.org/officeDocument/2006/relationships" xmlns:p="http://schemas.openxmlformats.org/presentationml/2006/main">
+  <p:cSld>
+    <p:spTree>
+      <p:nvGrpSpPr>
+        <p:cNvPr id="1" name=""/>
+        <p:cNvGrpSpPr/>
+        <p:nvPr/>
+      </p:nvGrpSpPr>
+      <p:grpSpPr>
+        <a:xfrm>
+          <a:off x="0" y="0"/>
+          <a:ext cx="0" cy="0"/>
+          <a:chOff x="0" y="0"/>
+          <a:chExt cx="0" cy="0"/>
+        </a:xfrm>
+      </p:grpSpPr>
+      <p:sp>
+        <p:nvSpPr>
+          <p:cNvPr id="2" name="Title 1">
+            <a:extLst>
+              <a:ext uri="{FF2B5EF4-FFF2-40B4-BE49-F238E27FC236}">
+                <a16:creationId xmlns:a16="http://schemas.microsoft.com/office/drawing/2014/main" id="{6B2E4ABD-1B14-7F48-89C2-85F1F9021A15}"/>
+              </a:ext>
+            </a:extLst>
+          </p:cNvPr>
+          <p:cNvSpPr>
+            <a:spLocks noGrp="1"/>
+          </p:cNvSpPr>
+          <p:nvPr>
+            <p:ph type="title"/>
+          </p:nvPr>
+        </p:nvSpPr>
+        <p:spPr/>
+        <p:txBody>
+          <a:bodyPr/>
+          <a:lstStyle/>
+          <a:p>
+            <a:endParaRPr lang="en-US"/>
+          </a:p>
+        </p:txBody>
+      </p:sp>
+      <p:sp>
+        <p:nvSpPr>
+          <p:cNvPr id="3" name="Content Placeholder 2">
+            <a:extLst>
+              <a:ext uri="{FF2B5EF4-FFF2-40B4-BE49-F238E27FC236}">
+                <a16:creationId xmlns:a16="http://schemas.microsoft.com/office/drawing/2014/main" id="{D72F7E4D-C31E-DB46-9C3D-3EA8D69A5704}"/>
+              </a:ext>
+            </a:extLst>
+          </p:cNvPr>
+          <p:cNvSpPr>
+            <a:spLocks noGrp="1"/>
+          </p:cNvSpPr>
+          <p:nvPr>
+            <p:ph sz="half" idx="1"/>
+          </p:nvPr>
+        </p:nvSpPr>
+        <p:spPr/>
+        <p:txBody>
+          <a:bodyPr/>
+          <a:lstStyle/>
+          <a:p>
+            <a:endParaRPr lang="en-US"/>
+          </a:p>
+        </p:txBody>
+      </p:sp>
+      <p:sp>
+        <p:nvSpPr>
+          <p:cNvPr id="4" name="Content Placeholder 3">
+            <a:extLst>
+              <a:ext uri="{FF2B5EF4-FFF2-40B4-BE49-F238E27FC236}">
+                <a16:creationId xmlns:a16="http://schemas.microsoft.com/office/drawing/2014/main" id="{E4D7D2CA-9F48-D44C-96AA-13C7FFDF2B47}"/>
+              </a:ext>
+            </a:extLst>
+          </p:cNvPr>
+          <p:cNvSpPr>
+            <a:spLocks noGrp="1"/>
+          </p:cNvSpPr>
+          <p:nvPr>
+            <p:ph sz="half" idx="2"/>
+          </p:nvPr>
+        </p:nvSpPr>
+        <p:spPr/>
+        <p:txBody>
+          <a:bodyPr/>
+          <a:lstStyle/>
+          <a:p>
+            <a:endParaRPr lang="en-US"/>
+          </a:p>
+        </p:txBody>
+      </p:sp>
+    </p:spTree>
+    <p:extLst>
+      <p:ext uri="{BB962C8B-B14F-4D97-AF65-F5344CB8AC3E}">
+        <p14:creationId xmlns:p14="http://schemas.microsoft.com/office/powerpoint/2010/main" val="355354599"/>
       </p:ext>
     </p:extLst>
   </p:cSld>

</xml_diff>